<commit_message>
Started writing the fit quality L-MLT distribution.
</commit_message>
<xml_diff>
--- a/reports/20230316_dusk_microbursts.pptx
+++ b/reports/20230316_dusk_microbursts.pptx
@@ -3741,8 +3741,13 @@
           <a:p>
             <a:r>
               <a:rPr lang="en-US" dirty="0"/>
-              <a:t>MeV Microbursts at Dusk</a:t>
-            </a:r>
+              <a:t>Dusk </a:t>
+            </a:r>
+            <a:r>
+              <a:rPr lang="en-US"/>
+              <a:t>MeV Microbursts</a:t>
+            </a:r>
+            <a:endParaRPr lang="en-US" dirty="0"/>
           </a:p>
         </p:txBody>
       </p:sp>
@@ -3857,7 +3862,7 @@
         <p:spPr/>
         <p:txBody>
           <a:bodyPr>
-            <a:normAutofit lnSpcReduction="10000"/>
+            <a:normAutofit fontScale="92500" lnSpcReduction="20000"/>
           </a:bodyPr>
           <a:lstStyle/>
           <a:p>
@@ -3959,6 +3964,12 @@
             <a:r>
               <a:rPr lang="en-US" dirty="0"/>
               <a:t>=[16, 22] and with adj_R^2&lt;0.5</a:t>
+            </a:r>
+          </a:p>
+          <a:p>
+            <a:r>
+              <a:rPr lang="en-US" dirty="0"/>
+              <a:t>I generated the ~6500 plots and I plan to upload them to Google Drive (LINK)</a:t>
             </a:r>
           </a:p>
         </p:txBody>

</xml_diff>